<commit_message>
Prior to Mohamad Ahmad 224655356
</commit_message>
<xml_diff>
--- a/PowerPoint Presentation Template.pptx
+++ b/PowerPoint Presentation Template.pptx
@@ -249,7 +249,7 @@
           <a:p>
             <a:fld id="{F352A77B-D33C-49B3-A83C-450AA2ED72B3}" type="datetimeFigureOut">
               <a:rPr lang="en-US" smtClean="0"/>
-              <a:t>4/9/2025</a:t>
+              <a:t>4/12/2025</a:t>
             </a:fld>
             <a:endParaRPr lang="en-US" dirty="0"/>
           </a:p>
@@ -426,7 +426,7 @@
           <a:p>
             <a:fld id="{E38D8F9A-F5CB-4EF8-A859-ED5E107B9763}" type="datetimeFigureOut">
               <a:rPr lang="en-US" smtClean="0"/>
-              <a:t>4/9/2025</a:t>
+              <a:t>4/12/2025</a:t>
             </a:fld>
             <a:endParaRPr lang="en-US" dirty="0"/>
           </a:p>
@@ -7123,36 +7123,6 @@
           </a:p>
         </p:txBody>
       </p:sp>
-      <p:pic>
-        <p:nvPicPr>
-          <p:cNvPr id="6" name="Picture 5" descr="A diagram of a customer">
-            <a:extLst>
-              <a:ext uri="{FF2B5EF4-FFF2-40B4-BE49-F238E27FC236}">
-                <a16:creationId xmlns:a16="http://schemas.microsoft.com/office/drawing/2014/main" id="{D86AA1F5-E2C2-271A-811F-77BF62463AFF}"/>
-              </a:ext>
-            </a:extLst>
-          </p:cNvPr>
-          <p:cNvPicPr>
-            <a:picLocks noChangeAspect="1"/>
-          </p:cNvPicPr>
-          <p:nvPr/>
-        </p:nvPicPr>
-        <p:blipFill>
-          <a:blip r:embed="rId2"/>
-          <a:stretch>
-            <a:fillRect/>
-          </a:stretch>
-        </p:blipFill>
-        <p:spPr>
-          <a:xfrm>
-            <a:off x="807529" y="1310640"/>
-            <a:ext cx="10906125" cy="5334000"/>
-          </a:xfrm>
-          <a:prstGeom prst="rect">
-            <a:avLst/>
-          </a:prstGeom>
-        </p:spPr>
-      </p:pic>
     </p:spTree>
     <p:extLst>
       <p:ext uri="{BB962C8B-B14F-4D97-AF65-F5344CB8AC3E}">
@@ -7254,36 +7224,6 @@
           </a:p>
         </p:txBody>
       </p:sp>
-      <p:pic>
-        <p:nvPicPr>
-          <p:cNvPr id="8" name="Picture 7" descr="A screenshot of a computer&#10;&#10;AI-generated content may be incorrect.">
-            <a:extLst>
-              <a:ext uri="{FF2B5EF4-FFF2-40B4-BE49-F238E27FC236}">
-                <a16:creationId xmlns:a16="http://schemas.microsoft.com/office/drawing/2014/main" id="{174FB6BD-C4B2-7AF5-FFE1-857924D4B25B}"/>
-              </a:ext>
-            </a:extLst>
-          </p:cNvPr>
-          <p:cNvPicPr>
-            <a:picLocks noChangeAspect="1"/>
-          </p:cNvPicPr>
-          <p:nvPr/>
-        </p:nvPicPr>
-        <p:blipFill>
-          <a:blip r:embed="rId2"/>
-          <a:stretch>
-            <a:fillRect/>
-          </a:stretch>
-        </p:blipFill>
-        <p:spPr>
-          <a:xfrm>
-            <a:off x="1744009" y="794829"/>
-            <a:ext cx="4729944" cy="5953318"/>
-          </a:xfrm>
-          <a:prstGeom prst="rect">
-            <a:avLst/>
-          </a:prstGeom>
-        </p:spPr>
-      </p:pic>
     </p:spTree>
     <p:extLst>
       <p:ext uri="{BB962C8B-B14F-4D97-AF65-F5344CB8AC3E}">
@@ -8672,15 +8612,6 @@
 </file>
 
 <file path=customXml/item1.xml><?xml version="1.0" encoding="utf-8"?>
-<?mso-contentType ?>
-<FormTemplates xmlns="http://schemas.microsoft.com/sharepoint/v3/contenttype/forms">
-  <Display>DocumentLibraryForm</Display>
-  <Edit>DocumentLibraryForm</Edit>
-  <New>DocumentLibraryForm</New>
-</FormTemplates>
-</file>
-
-<file path=customXml/item2.xml><?xml version="1.0" encoding="utf-8"?>
 <p:properties xmlns:p="http://schemas.microsoft.com/office/2006/metadata/properties" xmlns:xsi="http://www.w3.org/2001/XMLSchema-instance" xmlns:pc="http://schemas.microsoft.com/office/infopath/2007/PartnerControls">
   <documentManagement>
     <_ip_UnifiedCompliancePolicyUIAction xmlns="http://schemas.microsoft.com/sharepoint/v3" xsi:nil="true"/>
@@ -8698,6 +8629,15 @@
     <MediaServiceKeyPoints xmlns="71af3243-3dd4-4a8d-8c0d-dd76da1f02a5" xsi:nil="true"/>
   </documentManagement>
 </p:properties>
+</file>
+
+<file path=customXml/item2.xml><?xml version="1.0" encoding="utf-8"?>
+<?mso-contentType ?>
+<FormTemplates xmlns="http://schemas.microsoft.com/sharepoint/v3/contenttype/forms">
+  <Display>DocumentLibraryForm</Display>
+  <Edit>DocumentLibraryForm</Edit>
+  <New>DocumentLibraryForm</New>
+</FormTemplates>
 </file>
 
 <file path=customXml/item3.xml><?xml version="1.0" encoding="utf-8"?>
@@ -9013,14 +8953,6 @@
 </file>
 
 <file path=customXml/itemProps1.xml><?xml version="1.0" encoding="utf-8"?>
-<ds:datastoreItem xmlns:ds="http://schemas.openxmlformats.org/officeDocument/2006/customXml" ds:itemID="{B7B39BD0-040C-43BE-B0E4-512B09E8003F}">
-  <ds:schemaRefs>
-    <ds:schemaRef ds:uri="http://schemas.microsoft.com/sharepoint/v3/contenttype/forms"/>
-  </ds:schemaRefs>
-</ds:datastoreItem>
-</file>
-
-<file path=customXml/itemProps2.xml><?xml version="1.0" encoding="utf-8"?>
 <ds:datastoreItem xmlns:ds="http://schemas.openxmlformats.org/officeDocument/2006/customXml" ds:itemID="{AB045227-5724-4DBF-9712-031B1BFB2C3C}">
   <ds:schemaRefs>
     <ds:schemaRef ds:uri="http://schemas.microsoft.com/office/2006/metadata/properties"/>
@@ -9028,6 +8960,14 @@
     <ds:schemaRef ds:uri="http://schemas.microsoft.com/sharepoint/v3"/>
     <ds:schemaRef ds:uri="71af3243-3dd4-4a8d-8c0d-dd76da1f02a5"/>
     <ds:schemaRef ds:uri="230e9df3-be65-4c73-a93b-d1236ebd677e"/>
+  </ds:schemaRefs>
+</ds:datastoreItem>
+</file>
+
+<file path=customXml/itemProps2.xml><?xml version="1.0" encoding="utf-8"?>
+<ds:datastoreItem xmlns:ds="http://schemas.openxmlformats.org/officeDocument/2006/customXml" ds:itemID="{B7B39BD0-040C-43BE-B0E4-512B09E8003F}">
+  <ds:schemaRefs>
+    <ds:schemaRef ds:uri="http://schemas.microsoft.com/sharepoint/v3/contenttype/forms"/>
   </ds:schemaRefs>
 </ds:datastoreItem>
 </file>

</xml_diff>